<commit_message>
Moved prototype to problem spec
</commit_message>
<xml_diff>
--- a/Presentation.pptx
+++ b/Presentation.pptx
@@ -12,17 +12,17 @@
     <p:sldId id="257" r:id="rId3"/>
     <p:sldId id="258" r:id="rId4"/>
     <p:sldId id="259" r:id="rId5"/>
-    <p:sldId id="260" r:id="rId6"/>
-    <p:sldId id="261" r:id="rId7"/>
-    <p:sldId id="262" r:id="rId8"/>
-    <p:sldId id="263" r:id="rId9"/>
-    <p:sldId id="264" r:id="rId10"/>
-    <p:sldId id="265" r:id="rId11"/>
-    <p:sldId id="266" r:id="rId12"/>
-    <p:sldId id="267" r:id="rId13"/>
-    <p:sldId id="271" r:id="rId14"/>
-    <p:sldId id="269" r:id="rId15"/>
-    <p:sldId id="272" r:id="rId16"/>
+    <p:sldId id="273" r:id="rId6"/>
+    <p:sldId id="260" r:id="rId7"/>
+    <p:sldId id="261" r:id="rId8"/>
+    <p:sldId id="262" r:id="rId9"/>
+    <p:sldId id="263" r:id="rId10"/>
+    <p:sldId id="264" r:id="rId11"/>
+    <p:sldId id="265" r:id="rId12"/>
+    <p:sldId id="266" r:id="rId13"/>
+    <p:sldId id="267" r:id="rId14"/>
+    <p:sldId id="271" r:id="rId15"/>
+    <p:sldId id="269" r:id="rId16"/>
   </p:sldIdLst>
   <p:sldSz cx="12192000" cy="6858000"/>
   <p:notesSz cx="6858000" cy="9144000"/>
@@ -211,7 +211,7 @@
           <a:p>
             <a:fld id="{3DD81EF7-64ED-4B91-BA7B-1972BC6B4669}" type="datetimeFigureOut">
               <a:rPr lang="en-US" smtClean="0"/>
-              <a:t>12/12/2020</a:t>
+              <a:t>12/14/2020</a:t>
             </a:fld>
             <a:endParaRPr lang="en-US"/>
           </a:p>
@@ -919,7 +919,7 @@
           <a:p>
             <a:fld id="{48A87A34-81AB-432B-8DAE-1953F412C126}" type="datetimeFigureOut">
               <a:rPr lang="en-US" dirty="0"/>
-              <a:t>12/12/2020</a:t>
+              <a:t>12/14/2020</a:t>
             </a:fld>
             <a:endParaRPr lang="en-US" dirty="0"/>
           </a:p>
@@ -1125,7 +1125,7 @@
           <a:p>
             <a:fld id="{48A87A34-81AB-432B-8DAE-1953F412C126}" type="datetimeFigureOut">
               <a:rPr lang="en-US" dirty="0"/>
-              <a:t>12/12/2020</a:t>
+              <a:t>12/14/2020</a:t>
             </a:fld>
             <a:endParaRPr lang="en-US" dirty="0"/>
           </a:p>
@@ -1335,7 +1335,7 @@
           <a:p>
             <a:fld id="{48A87A34-81AB-432B-8DAE-1953F412C126}" type="datetimeFigureOut">
               <a:rPr lang="en-US" dirty="0"/>
-              <a:t>12/12/2020</a:t>
+              <a:t>12/14/2020</a:t>
             </a:fld>
             <a:endParaRPr lang="en-US" dirty="0"/>
           </a:p>
@@ -1531,7 +1531,7 @@
           <a:p>
             <a:fld id="{48A87A34-81AB-432B-8DAE-1953F412C126}" type="datetimeFigureOut">
               <a:rPr lang="en-US" dirty="0"/>
-              <a:t>12/12/2020</a:t>
+              <a:t>12/14/2020</a:t>
             </a:fld>
             <a:endParaRPr lang="en-US" dirty="0"/>
           </a:p>
@@ -1805,7 +1805,7 @@
           <a:p>
             <a:fld id="{48A87A34-81AB-432B-8DAE-1953F412C126}" type="datetimeFigureOut">
               <a:rPr lang="en-US" dirty="0"/>
-              <a:t>12/12/2020</a:t>
+              <a:t>12/14/2020</a:t>
             </a:fld>
             <a:endParaRPr lang="en-US" dirty="0"/>
           </a:p>
@@ -2068,7 +2068,7 @@
           <a:p>
             <a:fld id="{48A87A34-81AB-432B-8DAE-1953F412C126}" type="datetimeFigureOut">
               <a:rPr lang="en-US" dirty="0"/>
-              <a:t>12/12/2020</a:t>
+              <a:t>12/14/2020</a:t>
             </a:fld>
             <a:endParaRPr lang="en-US" dirty="0"/>
           </a:p>
@@ -2479,7 +2479,7 @@
           <a:p>
             <a:fld id="{48A87A34-81AB-432B-8DAE-1953F412C126}" type="datetimeFigureOut">
               <a:rPr lang="en-US" dirty="0"/>
-              <a:t>12/12/2020</a:t>
+              <a:t>12/14/2020</a:t>
             </a:fld>
             <a:endParaRPr lang="en-US" dirty="0"/>
           </a:p>
@@ -2623,7 +2623,7 @@
           <a:p>
             <a:fld id="{48A87A34-81AB-432B-8DAE-1953F412C126}" type="datetimeFigureOut">
               <a:rPr lang="en-US" dirty="0"/>
-              <a:t>12/12/2020</a:t>
+              <a:t>12/14/2020</a:t>
             </a:fld>
             <a:endParaRPr lang="en-US" dirty="0"/>
           </a:p>
@@ -2744,7 +2744,7 @@
           <a:p>
             <a:fld id="{48A87A34-81AB-432B-8DAE-1953F412C126}" type="datetimeFigureOut">
               <a:rPr lang="en-US" dirty="0"/>
-              <a:t>12/12/2020</a:t>
+              <a:t>12/14/2020</a:t>
             </a:fld>
             <a:endParaRPr lang="en-US" dirty="0"/>
           </a:p>
@@ -2990,7 +2990,7 @@
           <a:p>
             <a:fld id="{48A87A34-81AB-432B-8DAE-1953F412C126}" type="datetimeFigureOut">
               <a:rPr lang="en-US" dirty="0"/>
-              <a:t>12/12/2020</a:t>
+              <a:t>12/14/2020</a:t>
             </a:fld>
             <a:endParaRPr lang="en-US" dirty="0"/>
           </a:p>
@@ -3431,7 +3431,7 @@
             <a:fld id="{48A87A34-81AB-432B-8DAE-1953F412C126}" type="datetimeFigureOut">
               <a:rPr lang="en-US" dirty="0"/>
               <a:pPr/>
-              <a:t>12/12/2020</a:t>
+              <a:t>12/14/2020</a:t>
             </a:fld>
             <a:endParaRPr lang="en-US" dirty="0"/>
           </a:p>
@@ -3754,7 +3754,7 @@
             <a:fld id="{48A87A34-81AB-432B-8DAE-1953F412C126}" type="datetimeFigureOut">
               <a:rPr lang="en-US" dirty="0"/>
               <a:pPr/>
-              <a:t>12/12/2020</a:t>
+              <a:t>12/14/2020</a:t>
             </a:fld>
             <a:endParaRPr lang="en-US" dirty="0"/>
           </a:p>
@@ -4358,7 +4358,7 @@
           <p:cNvPr id="2" name="Title 1">
             <a:extLst>
               <a:ext uri="{FF2B5EF4-FFF2-40B4-BE49-F238E27FC236}">
-                <a16:creationId xmlns:a16="http://schemas.microsoft.com/office/drawing/2014/main" id="{E3CD02C1-5CC9-4585-B2F5-214D82EC0963}"/>
+                <a16:creationId xmlns:a16="http://schemas.microsoft.com/office/drawing/2014/main" id="{BCF7E804-4F5D-41BC-A9A9-B8D406B74389}"/>
               </a:ext>
             </a:extLst>
           </p:cNvPr>
@@ -4377,7 +4377,7 @@
             <a:pPr algn="ctr"/>
             <a:r>
               <a:rPr lang="en-US" dirty="0"/>
-              <a:t>Grading</a:t>
+              <a:t>Time schedule</a:t>
             </a:r>
           </a:p>
         </p:txBody>
@@ -4387,7 +4387,7 @@
           <p:cNvPr id="3" name="Content Placeholder 2">
             <a:extLst>
               <a:ext uri="{FF2B5EF4-FFF2-40B4-BE49-F238E27FC236}">
-                <a16:creationId xmlns:a16="http://schemas.microsoft.com/office/drawing/2014/main" id="{787A99EC-7311-47FA-B7C9-6ED53DF10566}"/>
+                <a16:creationId xmlns:a16="http://schemas.microsoft.com/office/drawing/2014/main" id="{327DD466-7C1D-48A5-A0AC-ACC64DEA7221}"/>
               </a:ext>
             </a:extLst>
           </p:cNvPr>
@@ -4405,36 +4405,39 @@
           <a:p>
             <a:r>
               <a:rPr lang="en-US" dirty="0"/>
-              <a:t>Project fully completed – A</a:t>
-            </a:r>
-          </a:p>
-          <a:p>
-            <a:r>
-              <a:rPr lang="en-US" dirty="0"/>
-              <a:t>Project half completed – A</a:t>
-            </a:r>
-          </a:p>
-          <a:p>
-            <a:r>
-              <a:rPr lang="en-US" dirty="0"/>
-              <a:t>Project started – A</a:t>
-            </a:r>
-          </a:p>
-          <a:p>
-            <a:r>
-              <a:rPr lang="en-US" dirty="0"/>
-              <a:t>Basically, do anything – get an A, that works right…</a:t>
-            </a:r>
-          </a:p>
-          <a:p>
-            <a:endParaRPr lang="en-US" dirty="0"/>
+              <a:t>Benchmark one:  Weeks 1 – 5 </a:t>
+            </a:r>
+          </a:p>
+          <a:p>
+            <a:r>
+              <a:rPr lang="en-US" dirty="0"/>
+              <a:t>Benchmark two: Weeks 6 – 8</a:t>
+            </a:r>
+          </a:p>
+          <a:p>
+            <a:r>
+              <a:rPr lang="en-US" dirty="0"/>
+              <a:t>Benchmark three: Weeks 9 -12</a:t>
+            </a:r>
+          </a:p>
+          <a:p>
+            <a:r>
+              <a:rPr lang="en-US" dirty="0"/>
+              <a:t>Final testing and report/presentation: Weeks 13 – 14</a:t>
+            </a:r>
+          </a:p>
+          <a:p>
+            <a:r>
+              <a:rPr lang="en-US" dirty="0"/>
+              <a:t>Benchmark four: Pending, will be split up amongst respective benchmarks or as time allows</a:t>
+            </a:r>
           </a:p>
         </p:txBody>
       </p:sp>
     </p:spTree>
     <p:extLst>
       <p:ext uri="{BB962C8B-B14F-4D97-AF65-F5344CB8AC3E}">
-        <p14:creationId xmlns:p14="http://schemas.microsoft.com/office/powerpoint/2010/main" val="2031358432"/>
+        <p14:creationId xmlns:p14="http://schemas.microsoft.com/office/powerpoint/2010/main" val="1623813321"/>
       </p:ext>
     </p:extLst>
   </p:cSld>
@@ -4466,7 +4469,7 @@
           <p:cNvPr id="2" name="Title 1">
             <a:extLst>
               <a:ext uri="{FF2B5EF4-FFF2-40B4-BE49-F238E27FC236}">
-                <a16:creationId xmlns:a16="http://schemas.microsoft.com/office/drawing/2014/main" id="{0FEA020A-5A91-46CB-93AC-8788F83C2B4A}"/>
+                <a16:creationId xmlns:a16="http://schemas.microsoft.com/office/drawing/2014/main" id="{E3CD02C1-5CC9-4585-B2F5-214D82EC0963}"/>
               </a:ext>
             </a:extLst>
           </p:cNvPr>
@@ -4485,7 +4488,7 @@
             <a:pPr algn="ctr"/>
             <a:r>
               <a:rPr lang="en-US" dirty="0"/>
-              <a:t>Grading Revised</a:t>
+              <a:t>Grading</a:t>
             </a:r>
           </a:p>
         </p:txBody>
@@ -4495,7 +4498,7 @@
           <p:cNvPr id="3" name="Content Placeholder 2">
             <a:extLst>
               <a:ext uri="{FF2B5EF4-FFF2-40B4-BE49-F238E27FC236}">
-                <a16:creationId xmlns:a16="http://schemas.microsoft.com/office/drawing/2014/main" id="{9787B047-F7BB-46E1-AE41-B85DB718EC2B}"/>
+                <a16:creationId xmlns:a16="http://schemas.microsoft.com/office/drawing/2014/main" id="{787A99EC-7311-47FA-B7C9-6ED53DF10566}"/>
               </a:ext>
             </a:extLst>
           </p:cNvPr>
@@ -4508,75 +4511,41 @@
         </p:nvSpPr>
         <p:spPr/>
         <p:txBody>
-          <a:bodyPr>
-            <a:normAutofit fontScale="92500" lnSpcReduction="20000"/>
-          </a:bodyPr>
-          <a:lstStyle/>
-          <a:p>
-            <a:r>
-              <a:rPr lang="en-US" dirty="0"/>
-              <a:t>Benchmark one: 45%</a:t>
-            </a:r>
-          </a:p>
-          <a:p>
-            <a:r>
-              <a:rPr lang="en-US" dirty="0"/>
-              <a:t>Benchmark two : 25%</a:t>
-            </a:r>
-          </a:p>
-          <a:p>
-            <a:pPr lvl="1"/>
-            <a:r>
-              <a:rPr lang="en-US" dirty="0"/>
-              <a:t>Planet and engine database: 15%</a:t>
-            </a:r>
-          </a:p>
-          <a:p>
-            <a:pPr lvl="1"/>
-            <a:r>
-              <a:rPr lang="en-US" dirty="0"/>
-              <a:t>User and custom engine database 10%</a:t>
-            </a:r>
-          </a:p>
-          <a:p>
-            <a:r>
-              <a:rPr lang="en-US" dirty="0"/>
-              <a:t>Benchmark three: 20%</a:t>
-            </a:r>
-          </a:p>
-          <a:p>
-            <a:pPr lvl="1"/>
-            <a:r>
-              <a:rPr lang="en-US" dirty="0"/>
-              <a:t>User account 10%</a:t>
-            </a:r>
-          </a:p>
-          <a:p>
-            <a:pPr lvl="1"/>
-            <a:r>
-              <a:rPr lang="en-US" dirty="0"/>
-              <a:t>Custom engine 5%</a:t>
-            </a:r>
-          </a:p>
-          <a:p>
-            <a:pPr lvl="1"/>
-            <a:r>
-              <a:rPr lang="en-US" dirty="0"/>
-              <a:t>Stage planner 5%</a:t>
-            </a:r>
-          </a:p>
-          <a:p>
-            <a:r>
-              <a:rPr lang="en-US" dirty="0"/>
-              <a:t>Presentation: 10%</a:t>
-            </a:r>
+          <a:bodyPr/>
+          <a:lstStyle/>
+          <a:p>
+            <a:r>
+              <a:rPr lang="en-US" dirty="0"/>
+              <a:t>Project fully completed – A</a:t>
+            </a:r>
+          </a:p>
+          <a:p>
+            <a:r>
+              <a:rPr lang="en-US" dirty="0"/>
+              <a:t>Project half completed – A</a:t>
+            </a:r>
+          </a:p>
+          <a:p>
+            <a:r>
+              <a:rPr lang="en-US" dirty="0"/>
+              <a:t>Project started – A</a:t>
+            </a:r>
+          </a:p>
+          <a:p>
+            <a:r>
+              <a:rPr lang="en-US" dirty="0"/>
+              <a:t>Basically, do anything – get an A, that works right…</a:t>
+            </a:r>
+          </a:p>
+          <a:p>
+            <a:endParaRPr lang="en-US" dirty="0"/>
           </a:p>
         </p:txBody>
       </p:sp>
     </p:spTree>
     <p:extLst>
       <p:ext uri="{BB962C8B-B14F-4D97-AF65-F5344CB8AC3E}">
-        <p14:creationId xmlns:p14="http://schemas.microsoft.com/office/powerpoint/2010/main" val="2251421691"/>
+        <p14:creationId xmlns:p14="http://schemas.microsoft.com/office/powerpoint/2010/main" val="2031358432"/>
       </p:ext>
     </p:extLst>
   </p:cSld>
@@ -4608,7 +4577,7 @@
           <p:cNvPr id="2" name="Title 1">
             <a:extLst>
               <a:ext uri="{FF2B5EF4-FFF2-40B4-BE49-F238E27FC236}">
-                <a16:creationId xmlns:a16="http://schemas.microsoft.com/office/drawing/2014/main" id="{3D25DB84-CE48-48D3-9372-E4ACBCBA5877}"/>
+                <a16:creationId xmlns:a16="http://schemas.microsoft.com/office/drawing/2014/main" id="{0FEA020A-5A91-46CB-93AC-8788F83C2B4A}"/>
               </a:ext>
             </a:extLst>
           </p:cNvPr>
@@ -4627,7 +4596,7 @@
             <a:pPr algn="ctr"/>
             <a:r>
               <a:rPr lang="en-US" dirty="0"/>
-              <a:t>deliverables</a:t>
+              <a:t>Grading Revised</a:t>
             </a:r>
           </a:p>
         </p:txBody>
@@ -4637,7 +4606,7 @@
           <p:cNvPr id="3" name="Content Placeholder 2">
             <a:extLst>
               <a:ext uri="{FF2B5EF4-FFF2-40B4-BE49-F238E27FC236}">
-                <a16:creationId xmlns:a16="http://schemas.microsoft.com/office/drawing/2014/main" id="{9C596A01-012B-45B4-864D-351B9E67D689}"/>
+                <a16:creationId xmlns:a16="http://schemas.microsoft.com/office/drawing/2014/main" id="{9787B047-F7BB-46E1-AE41-B85DB718EC2B}"/>
               </a:ext>
             </a:extLst>
           </p:cNvPr>
@@ -4657,63 +4626,68 @@
           <a:p>
             <a:r>
               <a:rPr lang="en-US" dirty="0"/>
-              <a:t>Proposal and presentation files</a:t>
-            </a:r>
-          </a:p>
-          <a:p>
-            <a:r>
-              <a:rPr lang="en-US" dirty="0"/>
-              <a:t>UML diagram</a:t>
-            </a:r>
-          </a:p>
-          <a:p>
-            <a:r>
-              <a:rPr lang="en-US" dirty="0"/>
-              <a:t>Source code</a:t>
-            </a:r>
-          </a:p>
-          <a:p>
-            <a:r>
-              <a:rPr lang="en-US" dirty="0"/>
-              <a:t>Documentation of project functionality</a:t>
-            </a:r>
-          </a:p>
-          <a:p>
-            <a:r>
-              <a:rPr lang="en-US" dirty="0"/>
-              <a:t>Sample output of a running project</a:t>
-            </a:r>
-          </a:p>
-          <a:p>
-            <a:r>
-              <a:rPr lang="en-US" dirty="0"/>
-              <a:t>Executables</a:t>
-            </a:r>
-          </a:p>
-          <a:p>
-            <a:r>
-              <a:rPr lang="en-US" dirty="0"/>
-              <a:t>Project postmortem </a:t>
-            </a:r>
-          </a:p>
-          <a:p>
-            <a:r>
-              <a:rPr lang="en-US" dirty="0"/>
-              <a:t>List of uncompleted areas(if applicable)</a:t>
-            </a:r>
-          </a:p>
-          <a:p>
-            <a:endParaRPr lang="en-US" dirty="0"/>
-          </a:p>
-          <a:p>
-            <a:endParaRPr lang="en-US" dirty="0"/>
+              <a:t>Benchmark one: 45%</a:t>
+            </a:r>
+          </a:p>
+          <a:p>
+            <a:r>
+              <a:rPr lang="en-US" dirty="0"/>
+              <a:t>Benchmark two : 25%</a:t>
+            </a:r>
+          </a:p>
+          <a:p>
+            <a:pPr lvl="1"/>
+            <a:r>
+              <a:rPr lang="en-US" dirty="0"/>
+              <a:t>Planet and engine database: 15%</a:t>
+            </a:r>
+          </a:p>
+          <a:p>
+            <a:pPr lvl="1"/>
+            <a:r>
+              <a:rPr lang="en-US" dirty="0"/>
+              <a:t>User and custom engine database 10%</a:t>
+            </a:r>
+          </a:p>
+          <a:p>
+            <a:r>
+              <a:rPr lang="en-US" dirty="0"/>
+              <a:t>Benchmark three: 20%</a:t>
+            </a:r>
+          </a:p>
+          <a:p>
+            <a:pPr lvl="1"/>
+            <a:r>
+              <a:rPr lang="en-US" dirty="0"/>
+              <a:t>User account 10%</a:t>
+            </a:r>
+          </a:p>
+          <a:p>
+            <a:pPr lvl="1"/>
+            <a:r>
+              <a:rPr lang="en-US" dirty="0"/>
+              <a:t>Custom engine 5%</a:t>
+            </a:r>
+          </a:p>
+          <a:p>
+            <a:pPr lvl="1"/>
+            <a:r>
+              <a:rPr lang="en-US" dirty="0"/>
+              <a:t>Stage planner 5%</a:t>
+            </a:r>
+          </a:p>
+          <a:p>
+            <a:r>
+              <a:rPr lang="en-US" dirty="0"/>
+              <a:t>Presentation: 10%</a:t>
+            </a:r>
           </a:p>
         </p:txBody>
       </p:sp>
     </p:spTree>
     <p:extLst>
       <p:ext uri="{BB962C8B-B14F-4D97-AF65-F5344CB8AC3E}">
-        <p14:creationId xmlns:p14="http://schemas.microsoft.com/office/powerpoint/2010/main" val="2958348435"/>
+        <p14:creationId xmlns:p14="http://schemas.microsoft.com/office/powerpoint/2010/main" val="2251421691"/>
       </p:ext>
     </p:extLst>
   </p:cSld>
@@ -4740,40 +4714,117 @@
           <a:chExt cx="0" cy="0"/>
         </a:xfrm>
       </p:grpSpPr>
-      <p:pic>
-        <p:nvPicPr>
-          <p:cNvPr id="3" name="Picture 2">
+      <p:sp>
+        <p:nvSpPr>
+          <p:cNvPr id="2" name="Title 1">
             <a:extLst>
               <a:ext uri="{FF2B5EF4-FFF2-40B4-BE49-F238E27FC236}">
-                <a16:creationId xmlns:a16="http://schemas.microsoft.com/office/drawing/2014/main" id="{1F325A02-7C5F-4F54-93DF-22704DCC1453}"/>
+                <a16:creationId xmlns:a16="http://schemas.microsoft.com/office/drawing/2014/main" id="{3D25DB84-CE48-48D3-9372-E4ACBCBA5877}"/>
               </a:ext>
             </a:extLst>
           </p:cNvPr>
-          <p:cNvPicPr>
-            <a:picLocks noChangeAspect="1"/>
-          </p:cNvPicPr>
-          <p:nvPr/>
-        </p:nvPicPr>
-        <p:blipFill>
-          <a:blip r:embed="rId2"/>
-          <a:stretch>
-            <a:fillRect/>
-          </a:stretch>
-        </p:blipFill>
-        <p:spPr>
-          <a:xfrm>
-            <a:off x="1494953" y="0"/>
-            <a:ext cx="9202094" cy="6858000"/>
-          </a:xfrm>
-          <a:prstGeom prst="rect">
-            <a:avLst/>
-          </a:prstGeom>
-        </p:spPr>
-      </p:pic>
+          <p:cNvSpPr>
+            <a:spLocks noGrp="1"/>
+          </p:cNvSpPr>
+          <p:nvPr>
+            <p:ph type="title"/>
+          </p:nvPr>
+        </p:nvSpPr>
+        <p:spPr/>
+        <p:txBody>
+          <a:bodyPr/>
+          <a:lstStyle/>
+          <a:p>
+            <a:pPr algn="ctr"/>
+            <a:r>
+              <a:rPr lang="en-US" dirty="0"/>
+              <a:t>deliverables</a:t>
+            </a:r>
+          </a:p>
+        </p:txBody>
+      </p:sp>
+      <p:sp>
+        <p:nvSpPr>
+          <p:cNvPr id="3" name="Content Placeholder 2">
+            <a:extLst>
+              <a:ext uri="{FF2B5EF4-FFF2-40B4-BE49-F238E27FC236}">
+                <a16:creationId xmlns:a16="http://schemas.microsoft.com/office/drawing/2014/main" id="{9C596A01-012B-45B4-864D-351B9E67D689}"/>
+              </a:ext>
+            </a:extLst>
+          </p:cNvPr>
+          <p:cNvSpPr>
+            <a:spLocks noGrp="1"/>
+          </p:cNvSpPr>
+          <p:nvPr>
+            <p:ph idx="1"/>
+          </p:nvPr>
+        </p:nvSpPr>
+        <p:spPr/>
+        <p:txBody>
+          <a:bodyPr>
+            <a:normAutofit fontScale="92500" lnSpcReduction="20000"/>
+          </a:bodyPr>
+          <a:lstStyle/>
+          <a:p>
+            <a:r>
+              <a:rPr lang="en-US" dirty="0"/>
+              <a:t>Proposal and presentation files</a:t>
+            </a:r>
+          </a:p>
+          <a:p>
+            <a:r>
+              <a:rPr lang="en-US" dirty="0"/>
+              <a:t>UML diagram</a:t>
+            </a:r>
+          </a:p>
+          <a:p>
+            <a:r>
+              <a:rPr lang="en-US" dirty="0"/>
+              <a:t>Source code</a:t>
+            </a:r>
+          </a:p>
+          <a:p>
+            <a:r>
+              <a:rPr lang="en-US" dirty="0"/>
+              <a:t>Documentation of project functionality</a:t>
+            </a:r>
+          </a:p>
+          <a:p>
+            <a:r>
+              <a:rPr lang="en-US" dirty="0"/>
+              <a:t>Sample output of a running project</a:t>
+            </a:r>
+          </a:p>
+          <a:p>
+            <a:r>
+              <a:rPr lang="en-US" dirty="0"/>
+              <a:t>Executables</a:t>
+            </a:r>
+          </a:p>
+          <a:p>
+            <a:r>
+              <a:rPr lang="en-US" dirty="0"/>
+              <a:t>Project postmortem </a:t>
+            </a:r>
+          </a:p>
+          <a:p>
+            <a:r>
+              <a:rPr lang="en-US" dirty="0"/>
+              <a:t>List of uncompleted areas(if applicable)</a:t>
+            </a:r>
+          </a:p>
+          <a:p>
+            <a:endParaRPr lang="en-US" dirty="0"/>
+          </a:p>
+          <a:p>
+            <a:endParaRPr lang="en-US" dirty="0"/>
+          </a:p>
+        </p:txBody>
+      </p:sp>
     </p:spTree>
     <p:extLst>
       <p:ext uri="{BB962C8B-B14F-4D97-AF65-F5344CB8AC3E}">
-        <p14:creationId xmlns:p14="http://schemas.microsoft.com/office/powerpoint/2010/main" val="2874701619"/>
+        <p14:creationId xmlns:p14="http://schemas.microsoft.com/office/powerpoint/2010/main" val="2958348435"/>
       </p:ext>
     </p:extLst>
   </p:cSld>
@@ -4800,45 +4851,40 @@
           <a:chExt cx="0" cy="0"/>
         </a:xfrm>
       </p:grpSpPr>
-      <p:sp>
-        <p:nvSpPr>
-          <p:cNvPr id="2" name="TextBox 1">
+      <p:pic>
+        <p:nvPicPr>
+          <p:cNvPr id="3" name="Picture 2">
             <a:extLst>
               <a:ext uri="{FF2B5EF4-FFF2-40B4-BE49-F238E27FC236}">
-                <a16:creationId xmlns:a16="http://schemas.microsoft.com/office/drawing/2014/main" id="{411186F0-3CFC-4144-B1DB-0BC95F9F541B}"/>
+                <a16:creationId xmlns:a16="http://schemas.microsoft.com/office/drawing/2014/main" id="{1F325A02-7C5F-4F54-93DF-22704DCC1453}"/>
               </a:ext>
             </a:extLst>
           </p:cNvPr>
-          <p:cNvSpPr txBox="1"/>
+          <p:cNvPicPr>
+            <a:picLocks noChangeAspect="1"/>
+          </p:cNvPicPr>
           <p:nvPr/>
-        </p:nvSpPr>
+        </p:nvPicPr>
+        <p:blipFill>
+          <a:blip r:embed="rId2"/>
+          <a:stretch>
+            <a:fillRect/>
+          </a:stretch>
+        </p:blipFill>
         <p:spPr>
           <a:xfrm>
-            <a:off x="4773336" y="2508308"/>
-            <a:ext cx="2497800" cy="707886"/>
+            <a:off x="1494953" y="0"/>
+            <a:ext cx="9202094" cy="6858000"/>
           </a:xfrm>
           <a:prstGeom prst="rect">
             <a:avLst/>
           </a:prstGeom>
-          <a:noFill/>
-        </p:spPr>
-        <p:txBody>
-          <a:bodyPr wrap="none" rtlCol="0">
-            <a:spAutoFit/>
-          </a:bodyPr>
-          <a:lstStyle/>
-          <a:p>
-            <a:r>
-              <a:rPr lang="en-US" sz="4000" dirty="0"/>
-              <a:t>Questions?</a:t>
-            </a:r>
-          </a:p>
-        </p:txBody>
-      </p:sp>
+        </p:spPr>
+      </p:pic>
     </p:spTree>
     <p:extLst>
       <p:ext uri="{BB962C8B-B14F-4D97-AF65-F5344CB8AC3E}">
-        <p14:creationId xmlns:p14="http://schemas.microsoft.com/office/powerpoint/2010/main" val="1111599632"/>
+        <p14:creationId xmlns:p14="http://schemas.microsoft.com/office/powerpoint/2010/main" val="2874701619"/>
       </p:ext>
     </p:extLst>
   </p:cSld>
@@ -4865,10 +4911,45 @@
           <a:chExt cx="0" cy="0"/>
         </a:xfrm>
       </p:grpSpPr>
+      <p:sp>
+        <p:nvSpPr>
+          <p:cNvPr id="2" name="TextBox 1">
+            <a:extLst>
+              <a:ext uri="{FF2B5EF4-FFF2-40B4-BE49-F238E27FC236}">
+                <a16:creationId xmlns:a16="http://schemas.microsoft.com/office/drawing/2014/main" id="{411186F0-3CFC-4144-B1DB-0BC95F9F541B}"/>
+              </a:ext>
+            </a:extLst>
+          </p:cNvPr>
+          <p:cNvSpPr txBox="1"/>
+          <p:nvPr/>
+        </p:nvSpPr>
+        <p:spPr>
+          <a:xfrm>
+            <a:off x="4773336" y="2508308"/>
+            <a:ext cx="2497800" cy="707886"/>
+          </a:xfrm>
+          <a:prstGeom prst="rect">
+            <a:avLst/>
+          </a:prstGeom>
+          <a:noFill/>
+        </p:spPr>
+        <p:txBody>
+          <a:bodyPr wrap="none" rtlCol="0">
+            <a:spAutoFit/>
+          </a:bodyPr>
+          <a:lstStyle/>
+          <a:p>
+            <a:r>
+              <a:rPr lang="en-US" sz="4000" dirty="0"/>
+              <a:t>Questions?</a:t>
+            </a:r>
+          </a:p>
+        </p:txBody>
+      </p:sp>
     </p:spTree>
     <p:extLst>
       <p:ext uri="{BB962C8B-B14F-4D97-AF65-F5344CB8AC3E}">
-        <p14:creationId xmlns:p14="http://schemas.microsoft.com/office/powerpoint/2010/main" val="2593847435"/>
+        <p14:creationId xmlns:p14="http://schemas.microsoft.com/office/powerpoint/2010/main" val="1111599632"/>
       </p:ext>
     </p:extLst>
   </p:cSld>
@@ -5219,7 +5300,7 @@
         <p:spPr/>
         <p:txBody>
           <a:bodyPr>
-            <a:normAutofit fontScale="92500" lnSpcReduction="10000"/>
+            <a:normAutofit/>
           </a:bodyPr>
           <a:lstStyle/>
           <a:p>
@@ -5238,40 +5319,6 @@
             <a:r>
               <a:rPr lang="en-US" dirty="0"/>
               <a:t>Calculating the math for each engine is tedious at best</a:t>
-            </a:r>
-          </a:p>
-          <a:p>
-            <a:r>
-              <a:rPr lang="en-US" dirty="0"/>
-              <a:t>My app will allow the user to:</a:t>
-            </a:r>
-          </a:p>
-          <a:p>
-            <a:pPr lvl="1"/>
-            <a:r>
-              <a:rPr lang="en-US" dirty="0"/>
-              <a:t>Select engine(s) to test</a:t>
-            </a:r>
-          </a:p>
-          <a:p>
-            <a:pPr lvl="1"/>
-            <a:r>
-              <a:rPr lang="en-US" dirty="0"/>
-              <a:t>Input desired DV,  TWR for their journey </a:t>
-            </a:r>
-          </a:p>
-          <a:p>
-            <a:pPr lvl="1"/>
-            <a:r>
-              <a:rPr lang="en-US" dirty="0"/>
-              <a:t>Output the results and allow the user to select a specific DV/TWR point to see detailed results</a:t>
-            </a:r>
-          </a:p>
-          <a:p>
-            <a:pPr lvl="1"/>
-            <a:r>
-              <a:rPr lang="en-US" dirty="0"/>
-              <a:t>Make an account so they can create custom engines to test for and track previous tests</a:t>
             </a:r>
           </a:p>
         </p:txBody>
@@ -5290,6 +5337,497 @@
 </file>
 
 <file path=ppt/slides/slide5.xml><?xml version="1.0" encoding="utf-8"?>
+<p:sld xmlns:a="http://schemas.openxmlformats.org/drawingml/2006/main" xmlns:r="http://schemas.openxmlformats.org/officeDocument/2006/relationships" xmlns:p="http://schemas.openxmlformats.org/presentationml/2006/main">
+  <p:cSld>
+    <p:bg>
+      <p:bgPr>
+        <a:gradFill rotWithShape="1">
+          <a:gsLst>
+            <a:gs pos="0">
+              <a:schemeClr val="bg2">
+                <a:tint val="94000"/>
+                <a:satMod val="80000"/>
+                <a:lumMod val="106000"/>
+              </a:schemeClr>
+            </a:gs>
+            <a:gs pos="100000">
+              <a:schemeClr val="bg2">
+                <a:shade val="80000"/>
+              </a:schemeClr>
+            </a:gs>
+          </a:gsLst>
+          <a:path path="circle">
+            <a:fillToRect l="43000" r="43000" b="100000"/>
+          </a:path>
+        </a:gradFill>
+        <a:effectLst/>
+      </p:bgPr>
+    </p:bg>
+    <p:spTree>
+      <p:nvGrpSpPr>
+        <p:cNvPr id="1" name=""/>
+        <p:cNvGrpSpPr/>
+        <p:nvPr/>
+      </p:nvGrpSpPr>
+      <p:grpSpPr>
+        <a:xfrm>
+          <a:off x="0" y="0"/>
+          <a:ext cx="0" cy="0"/>
+          <a:chOff x="0" y="0"/>
+          <a:chExt cx="0" cy="0"/>
+        </a:xfrm>
+      </p:grpSpPr>
+      <p:sp useBgFill="1">
+        <p:nvSpPr>
+          <p:cNvPr id="28" name="Rectangle 27">
+            <a:extLst>
+              <a:ext uri="{FF2B5EF4-FFF2-40B4-BE49-F238E27FC236}">
+                <a16:creationId xmlns:a16="http://schemas.microsoft.com/office/drawing/2014/main" id="{35C3D674-3D59-4E93-80CA-0C0A9095E816}"/>
+              </a:ext>
+              <a:ext uri="{C183D7F6-B498-43B3-948B-1728B52AA6E4}">
+                <adec:decorative xmlns:adec="http://schemas.microsoft.com/office/drawing/2017/decorative" val="1"/>
+              </a:ext>
+            </a:extLst>
+          </p:cNvPr>
+          <p:cNvSpPr>
+            <a:spLocks noGrp="1" noRot="1" noChangeAspect="1" noMove="1" noResize="1" noEditPoints="1" noAdjustHandles="1" noChangeArrowheads="1" noChangeShapeType="1" noTextEdit="1"/>
+          </p:cNvSpPr>
+          <p:nvPr>
+            <p:extLst>
+              <p:ext uri="{386F3935-93C4-4BCD-93E2-E3B085C9AB24}">
+                <p16:designElem xmlns:p16="http://schemas.microsoft.com/office/powerpoint/2015/main" val="1"/>
+              </p:ext>
+            </p:extLst>
+          </p:nvPr>
+        </p:nvSpPr>
+        <p:spPr>
+          <a:xfrm>
+            <a:off x="2" y="0"/>
+            <a:ext cx="12191695" cy="6858000"/>
+          </a:xfrm>
+          <a:prstGeom prst="rect">
+            <a:avLst/>
+          </a:prstGeom>
+          <a:ln>
+            <a:noFill/>
+          </a:ln>
+        </p:spPr>
+        <p:style>
+          <a:lnRef idx="2">
+            <a:schemeClr val="accent1">
+              <a:shade val="50000"/>
+            </a:schemeClr>
+          </a:lnRef>
+          <a:fillRef idx="1">
+            <a:schemeClr val="accent1"/>
+          </a:fillRef>
+          <a:effectRef idx="0">
+            <a:schemeClr val="accent1"/>
+          </a:effectRef>
+          <a:fontRef idx="minor">
+            <a:schemeClr val="lt1"/>
+          </a:fontRef>
+        </p:style>
+        <p:txBody>
+          <a:bodyPr rtlCol="0" anchor="ctr"/>
+          <a:lstStyle/>
+          <a:p>
+            <a:pPr algn="ctr"/>
+            <a:endParaRPr lang="en-US"/>
+          </a:p>
+        </p:txBody>
+      </p:sp>
+      <p:cxnSp>
+        <p:nvCxnSpPr>
+          <p:cNvPr id="30" name="Straight Connector 29">
+            <a:extLst>
+              <a:ext uri="{FF2B5EF4-FFF2-40B4-BE49-F238E27FC236}">
+                <a16:creationId xmlns:a16="http://schemas.microsoft.com/office/drawing/2014/main" id="{C884B8F8-FDC9-498B-9960-5D7260AFCB03}"/>
+              </a:ext>
+              <a:ext uri="{C183D7F6-B498-43B3-948B-1728B52AA6E4}">
+                <adec:decorative xmlns:adec="http://schemas.microsoft.com/office/drawing/2017/decorative" val="1"/>
+              </a:ext>
+            </a:extLst>
+          </p:cNvPr>
+          <p:cNvCxnSpPr>
+            <a:cxnSpLocks noGrp="1" noRot="1" noChangeAspect="1" noMove="1" noResize="1" noEditPoints="1" noAdjustHandles="1" noChangeArrowheads="1" noChangeShapeType="1"/>
+          </p:cNvCxnSpPr>
+          <p:nvPr>
+            <p:extLst>
+              <p:ext uri="{386F3935-93C4-4BCD-93E2-E3B085C9AB24}">
+                <p16:designElem xmlns:p16="http://schemas.microsoft.com/office/powerpoint/2015/main" val="1"/>
+              </p:ext>
+            </p:extLst>
+          </p:nvPr>
+        </p:nvCxnSpPr>
+        <p:spPr>
+          <a:xfrm>
+            <a:off x="1453896" y="1847088"/>
+            <a:ext cx="4177373" cy="0"/>
+          </a:xfrm>
+          <a:prstGeom prst="line">
+            <a:avLst/>
+          </a:prstGeom>
+          <a:ln w="31750"/>
+        </p:spPr>
+        <p:style>
+          <a:lnRef idx="3">
+            <a:schemeClr val="accent1"/>
+          </a:lnRef>
+          <a:fillRef idx="0">
+            <a:schemeClr val="accent1"/>
+          </a:fillRef>
+          <a:effectRef idx="2">
+            <a:schemeClr val="accent1"/>
+          </a:effectRef>
+          <a:fontRef idx="minor">
+            <a:schemeClr val="tx1"/>
+          </a:fontRef>
+        </p:style>
+      </p:cxnSp>
+      <p:sp>
+        <p:nvSpPr>
+          <p:cNvPr id="2" name="Title 1">
+            <a:extLst>
+              <a:ext uri="{FF2B5EF4-FFF2-40B4-BE49-F238E27FC236}">
+                <a16:creationId xmlns:a16="http://schemas.microsoft.com/office/drawing/2014/main" id="{4D5D5417-297E-4FDF-88ED-77699F792237}"/>
+              </a:ext>
+            </a:extLst>
+          </p:cNvPr>
+          <p:cNvSpPr>
+            <a:spLocks noGrp="1"/>
+          </p:cNvSpPr>
+          <p:nvPr>
+            <p:ph type="title"/>
+          </p:nvPr>
+        </p:nvSpPr>
+        <p:spPr>
+          <a:xfrm>
+            <a:off x="1451580" y="804521"/>
+            <a:ext cx="3674601" cy="1042568"/>
+          </a:xfrm>
+        </p:spPr>
+        <p:txBody>
+          <a:bodyPr>
+            <a:normAutofit/>
+          </a:bodyPr>
+          <a:lstStyle/>
+          <a:p>
+            <a:r>
+              <a:rPr lang="en-US" dirty="0"/>
+              <a:t>Problem specifications</a:t>
+            </a:r>
+          </a:p>
+        </p:txBody>
+      </p:sp>
+      <p:sp>
+        <p:nvSpPr>
+          <p:cNvPr id="32" name="Rectangle 31">
+            <a:extLst>
+              <a:ext uri="{FF2B5EF4-FFF2-40B4-BE49-F238E27FC236}">
+                <a16:creationId xmlns:a16="http://schemas.microsoft.com/office/drawing/2014/main" id="{EF2A81E1-BCBE-426B-8C09-33274E69409D}"/>
+              </a:ext>
+              <a:ext uri="{C183D7F6-B498-43B3-948B-1728B52AA6E4}">
+                <adec:decorative xmlns:adec="http://schemas.microsoft.com/office/drawing/2017/decorative" val="1"/>
+              </a:ext>
+            </a:extLst>
+          </p:cNvPr>
+          <p:cNvSpPr>
+            <a:spLocks noGrp="1" noRot="1" noChangeAspect="1" noMove="1" noResize="1" noEditPoints="1" noAdjustHandles="1" noChangeArrowheads="1" noChangeShapeType="1" noTextEdit="1"/>
+          </p:cNvSpPr>
+          <p:nvPr>
+            <p:extLst>
+              <p:ext uri="{386F3935-93C4-4BCD-93E2-E3B085C9AB24}">
+                <p16:designElem xmlns:p16="http://schemas.microsoft.com/office/powerpoint/2015/main" val="1"/>
+              </p:ext>
+            </p:extLst>
+          </p:nvPr>
+        </p:nvSpPr>
+        <p:spPr>
+          <a:xfrm>
+            <a:off x="0" y="2019476"/>
+            <a:ext cx="12192000" cy="4105941"/>
+          </a:xfrm>
+          <a:prstGeom prst="rect">
+            <a:avLst/>
+          </a:prstGeom>
+          <a:gradFill flip="none" rotWithShape="1">
+            <a:gsLst>
+              <a:gs pos="0">
+                <a:schemeClr val="bg2">
+                  <a:alpha val="0"/>
+                </a:schemeClr>
+              </a:gs>
+              <a:gs pos="100000">
+                <a:schemeClr val="bg2"/>
+              </a:gs>
+            </a:gsLst>
+            <a:lin ang="5400000" scaled="0"/>
+            <a:tileRect/>
+          </a:gradFill>
+          <a:ln>
+            <a:noFill/>
+          </a:ln>
+        </p:spPr>
+        <p:style>
+          <a:lnRef idx="2">
+            <a:schemeClr val="accent1">
+              <a:shade val="50000"/>
+            </a:schemeClr>
+          </a:lnRef>
+          <a:fillRef idx="1">
+            <a:schemeClr val="accent1"/>
+          </a:fillRef>
+          <a:effectRef idx="0">
+            <a:schemeClr val="accent1"/>
+          </a:effectRef>
+          <a:fontRef idx="minor">
+            <a:schemeClr val="lt1"/>
+          </a:fontRef>
+        </p:style>
+        <p:txBody>
+          <a:bodyPr rtlCol="0" anchor="ctr"/>
+          <a:lstStyle/>
+          <a:p>
+            <a:pPr lvl="0" algn="ctr"/>
+            <a:endParaRPr lang="en-US"/>
+          </a:p>
+        </p:txBody>
+      </p:sp>
+      <p:sp>
+        <p:nvSpPr>
+          <p:cNvPr id="8" name="Content Placeholder 7">
+            <a:extLst>
+              <a:ext uri="{FF2B5EF4-FFF2-40B4-BE49-F238E27FC236}">
+                <a16:creationId xmlns:a16="http://schemas.microsoft.com/office/drawing/2014/main" id="{AECCE76F-46A6-47CD-AE54-E72A5031766E}"/>
+              </a:ext>
+            </a:extLst>
+          </p:cNvPr>
+          <p:cNvSpPr>
+            <a:spLocks noGrp="1"/>
+          </p:cNvSpPr>
+          <p:nvPr>
+            <p:ph idx="1"/>
+          </p:nvPr>
+        </p:nvSpPr>
+        <p:spPr>
+          <a:xfrm>
+            <a:off x="1451581" y="2015732"/>
+            <a:ext cx="3674601" cy="4099318"/>
+          </a:xfrm>
+        </p:spPr>
+        <p:txBody>
+          <a:bodyPr>
+            <a:normAutofit/>
+          </a:bodyPr>
+          <a:lstStyle/>
+          <a:p>
+            <a:pPr>
+              <a:lnSpc>
+                <a:spcPct val="110000"/>
+              </a:lnSpc>
+            </a:pPr>
+            <a:r>
+              <a:rPr lang="en-US" dirty="0"/>
+              <a:t>My app will allow the user to:</a:t>
+            </a:r>
+          </a:p>
+          <a:p>
+            <a:pPr lvl="1">
+              <a:lnSpc>
+                <a:spcPct val="110000"/>
+              </a:lnSpc>
+            </a:pPr>
+            <a:r>
+              <a:rPr lang="en-US" dirty="0"/>
+              <a:t>Select engine(s) to test</a:t>
+            </a:r>
+          </a:p>
+          <a:p>
+            <a:pPr lvl="1">
+              <a:lnSpc>
+                <a:spcPct val="110000"/>
+              </a:lnSpc>
+            </a:pPr>
+            <a:r>
+              <a:rPr lang="en-US" dirty="0"/>
+              <a:t>Input desired DV,  TWR for their journey </a:t>
+            </a:r>
+          </a:p>
+          <a:p>
+            <a:pPr lvl="1">
+              <a:lnSpc>
+                <a:spcPct val="110000"/>
+              </a:lnSpc>
+            </a:pPr>
+            <a:r>
+              <a:rPr lang="en-US" dirty="0"/>
+              <a:t>Output the results and allow the user to select a specific DV/TWR point to see detailed results</a:t>
+            </a:r>
+          </a:p>
+          <a:p>
+            <a:pPr lvl="1">
+              <a:lnSpc>
+                <a:spcPct val="110000"/>
+              </a:lnSpc>
+            </a:pPr>
+            <a:r>
+              <a:rPr lang="en-US" dirty="0"/>
+              <a:t>Make an account so they can create custom engines to test for and track previous tests</a:t>
+            </a:r>
+          </a:p>
+          <a:p>
+            <a:pPr>
+              <a:lnSpc>
+                <a:spcPct val="110000"/>
+              </a:lnSpc>
+            </a:pPr>
+            <a:endParaRPr lang="en-US" dirty="0"/>
+          </a:p>
+        </p:txBody>
+      </p:sp>
+      <p:pic>
+        <p:nvPicPr>
+          <p:cNvPr id="16" name="Picture 15">
+            <a:extLst>
+              <a:ext uri="{FF2B5EF4-FFF2-40B4-BE49-F238E27FC236}">
+                <a16:creationId xmlns:a16="http://schemas.microsoft.com/office/drawing/2014/main" id="{C5BA6A8F-C05F-4CB9-B514-E2AB4DB2FC3B}"/>
+              </a:ext>
+            </a:extLst>
+          </p:cNvPr>
+          <p:cNvPicPr>
+            <a:picLocks noChangeAspect="1"/>
+          </p:cNvPicPr>
+          <p:nvPr/>
+        </p:nvPicPr>
+        <p:blipFill>
+          <a:blip r:embed="rId2"/>
+          <a:stretch>
+            <a:fillRect/>
+          </a:stretch>
+        </p:blipFill>
+        <p:spPr>
+          <a:xfrm>
+            <a:off x="5046451" y="804521"/>
+            <a:ext cx="7145550" cy="5323433"/>
+          </a:xfrm>
+          <a:prstGeom prst="rect">
+            <a:avLst/>
+          </a:prstGeom>
+        </p:spPr>
+      </p:pic>
+      <p:pic>
+        <p:nvPicPr>
+          <p:cNvPr id="34" name="Picture 33">
+            <a:extLst>
+              <a:ext uri="{FF2B5EF4-FFF2-40B4-BE49-F238E27FC236}">
+                <a16:creationId xmlns:a16="http://schemas.microsoft.com/office/drawing/2014/main" id="{39D1DDD4-5BB3-45BA-B9B3-06B62299AD79}"/>
+              </a:ext>
+              <a:ext uri="{C183D7F6-B498-43B3-948B-1728B52AA6E4}">
+                <adec:decorative xmlns:adec="http://schemas.microsoft.com/office/drawing/2017/decorative" val="1"/>
+              </a:ext>
+            </a:extLst>
+          </p:cNvPr>
+          <p:cNvPicPr>
+            <a:picLocks noGrp="1" noRot="1" noChangeAspect="1" noMove="1" noResize="1" noEditPoints="1" noAdjustHandles="1" noChangeArrowheads="1" noChangeShapeType="1" noCrop="1"/>
+          </p:cNvPicPr>
+          <p:nvPr>
+            <p:extLst>
+              <p:ext uri="{386F3935-93C4-4BCD-93E2-E3B085C9AB24}">
+                <p16:designElem xmlns:p16="http://schemas.microsoft.com/office/powerpoint/2015/main" val="1"/>
+              </p:ext>
+            </p:extLst>
+          </p:nvPr>
+        </p:nvPicPr>
+        <p:blipFill rotWithShape="1">
+          <a:blip r:embed="rId3">
+            <a:extLst>
+              <a:ext uri="{28A0092B-C50C-407E-A947-70E740481C1C}">
+                <a14:useLocalDpi xmlns:a14="http://schemas.microsoft.com/office/drawing/2010/main" val="0"/>
+              </a:ext>
+            </a:extLst>
+          </a:blip>
+          <a:srcRect t="1538" b="-1538"/>
+          <a:stretch/>
+        </p:blipFill>
+        <p:spPr bwMode="black">
+          <a:xfrm>
+            <a:off x="0" y="6126480"/>
+            <a:ext cx="12192000" cy="742950"/>
+          </a:xfrm>
+          <a:prstGeom prst="rect">
+            <a:avLst/>
+          </a:prstGeom>
+        </p:spPr>
+      </p:pic>
+      <p:cxnSp>
+        <p:nvCxnSpPr>
+          <p:cNvPr id="36" name="Straight Connector 35">
+            <a:extLst>
+              <a:ext uri="{FF2B5EF4-FFF2-40B4-BE49-F238E27FC236}">
+                <a16:creationId xmlns:a16="http://schemas.microsoft.com/office/drawing/2014/main" id="{A24DAE64-2302-42EA-8239-F2F0775CA5AD}"/>
+              </a:ext>
+              <a:ext uri="{C183D7F6-B498-43B3-948B-1728B52AA6E4}">
+                <adec:decorative xmlns:adec="http://schemas.microsoft.com/office/drawing/2017/decorative" val="1"/>
+              </a:ext>
+            </a:extLst>
+          </p:cNvPr>
+          <p:cNvCxnSpPr>
+            <a:cxnSpLocks noGrp="1" noRot="1" noChangeAspect="1" noMove="1" noResize="1" noEditPoints="1" noAdjustHandles="1" noChangeArrowheads="1" noChangeShapeType="1"/>
+          </p:cNvCxnSpPr>
+          <p:nvPr>
+            <p:extLst>
+              <p:ext uri="{386F3935-93C4-4BCD-93E2-E3B085C9AB24}">
+                <p16:designElem xmlns:p16="http://schemas.microsoft.com/office/powerpoint/2015/main" val="1"/>
+              </p:ext>
+            </p:extLst>
+          </p:nvPr>
+        </p:nvCxnSpPr>
+        <p:spPr>
+          <a:xfrm>
+            <a:off x="0" y="6128413"/>
+            <a:ext cx="12192000" cy="0"/>
+          </a:xfrm>
+          <a:prstGeom prst="line">
+            <a:avLst/>
+          </a:prstGeom>
+          <a:ln w="12700">
+            <a:solidFill>
+              <a:srgbClr val="000001">
+                <a:alpha val="20000"/>
+              </a:srgbClr>
+            </a:solidFill>
+          </a:ln>
+        </p:spPr>
+        <p:style>
+          <a:lnRef idx="1">
+            <a:schemeClr val="accent1"/>
+          </a:lnRef>
+          <a:fillRef idx="0">
+            <a:schemeClr val="accent1"/>
+          </a:fillRef>
+          <a:effectRef idx="0">
+            <a:schemeClr val="accent1"/>
+          </a:effectRef>
+          <a:fontRef idx="minor">
+            <a:schemeClr val="tx1"/>
+          </a:fontRef>
+        </p:style>
+      </p:cxnSp>
+    </p:spTree>
+    <p:extLst>
+      <p:ext uri="{BB962C8B-B14F-4D97-AF65-F5344CB8AC3E}">
+        <p14:creationId xmlns:p14="http://schemas.microsoft.com/office/powerpoint/2010/main" val="436399611"/>
+      </p:ext>
+    </p:extLst>
+  </p:cSld>
+  <p:clrMapOvr>
+    <a:masterClrMapping/>
+  </p:clrMapOvr>
+</p:sld>
+</file>
+
+<file path=ppt/slides/slide6.xml><?xml version="1.0" encoding="utf-8"?>
 <p:sld xmlns:a="http://schemas.openxmlformats.org/drawingml/2006/main" xmlns:r="http://schemas.openxmlformats.org/officeDocument/2006/relationships" xmlns:p="http://schemas.openxmlformats.org/presentationml/2006/main">
   <p:cSld>
     <p:bg>
@@ -6164,7 +6702,7 @@
 </p:sld>
 </file>
 
-<file path=ppt/slides/slide6.xml><?xml version="1.0" encoding="utf-8"?>
+<file path=ppt/slides/slide7.xml><?xml version="1.0" encoding="utf-8"?>
 <p:sld xmlns:a="http://schemas.openxmlformats.org/drawingml/2006/main" xmlns:r="http://schemas.openxmlformats.org/officeDocument/2006/relationships" xmlns:p="http://schemas.openxmlformats.org/presentationml/2006/main">
   <p:cSld>
     <p:bg>
@@ -6820,154 +7358,6 @@
 </p:sld>
 </file>
 
-<file path=ppt/slides/slide7.xml><?xml version="1.0" encoding="utf-8"?>
-<p:sld xmlns:a="http://schemas.openxmlformats.org/drawingml/2006/main" xmlns:r="http://schemas.openxmlformats.org/officeDocument/2006/relationships" xmlns:p="http://schemas.openxmlformats.org/presentationml/2006/main">
-  <p:cSld>
-    <p:spTree>
-      <p:nvGrpSpPr>
-        <p:cNvPr id="1" name=""/>
-        <p:cNvGrpSpPr/>
-        <p:nvPr/>
-      </p:nvGrpSpPr>
-      <p:grpSpPr>
-        <a:xfrm>
-          <a:off x="0" y="0"/>
-          <a:ext cx="0" cy="0"/>
-          <a:chOff x="0" y="0"/>
-          <a:chExt cx="0" cy="0"/>
-        </a:xfrm>
-      </p:grpSpPr>
-      <p:sp>
-        <p:nvSpPr>
-          <p:cNvPr id="2" name="Title 1">
-            <a:extLst>
-              <a:ext uri="{FF2B5EF4-FFF2-40B4-BE49-F238E27FC236}">
-                <a16:creationId xmlns:a16="http://schemas.microsoft.com/office/drawing/2014/main" id="{FCE038C0-E720-434B-A507-DF4E0E03CB5F}"/>
-              </a:ext>
-            </a:extLst>
-          </p:cNvPr>
-          <p:cNvSpPr>
-            <a:spLocks noGrp="1"/>
-          </p:cNvSpPr>
-          <p:nvPr>
-            <p:ph type="title"/>
-          </p:nvPr>
-        </p:nvSpPr>
-        <p:spPr/>
-        <p:txBody>
-          <a:bodyPr/>
-          <a:lstStyle/>
-          <a:p>
-            <a:pPr algn="ctr"/>
-            <a:r>
-              <a:rPr lang="en-US" dirty="0"/>
-              <a:t>Benchmark</a:t>
-            </a:r>
-          </a:p>
-        </p:txBody>
-      </p:sp>
-      <p:sp>
-        <p:nvSpPr>
-          <p:cNvPr id="3" name="Content Placeholder 2">
-            <a:extLst>
-              <a:ext uri="{FF2B5EF4-FFF2-40B4-BE49-F238E27FC236}">
-                <a16:creationId xmlns:a16="http://schemas.microsoft.com/office/drawing/2014/main" id="{A0EC9C09-449E-41BD-AAB8-AE931178668F}"/>
-              </a:ext>
-            </a:extLst>
-          </p:cNvPr>
-          <p:cNvSpPr>
-            <a:spLocks noGrp="1"/>
-          </p:cNvSpPr>
-          <p:nvPr>
-            <p:ph idx="1"/>
-          </p:nvPr>
-        </p:nvSpPr>
-        <p:spPr/>
-        <p:txBody>
-          <a:bodyPr>
-            <a:normAutofit fontScale="92500" lnSpcReduction="20000"/>
-          </a:bodyPr>
-          <a:lstStyle/>
-          <a:p>
-            <a:r>
-              <a:rPr lang="en-US" dirty="0"/>
-              <a:t>Benchmark one – core functionality</a:t>
-            </a:r>
-          </a:p>
-          <a:p>
-            <a:pPr lvl="1"/>
-            <a:r>
-              <a:rPr lang="en-US" dirty="0"/>
-              <a:t>Handle user input, do calculations, output the values and allow user to select DV/TWR point</a:t>
-            </a:r>
-          </a:p>
-          <a:p>
-            <a:r>
-              <a:rPr lang="en-US" dirty="0"/>
-              <a:t>Benchmark two – database creation</a:t>
-            </a:r>
-          </a:p>
-          <a:p>
-            <a:pPr lvl="1"/>
-            <a:r>
-              <a:rPr lang="en-US" dirty="0"/>
-              <a:t>Create database to store users, custom engines, base planet and engine values</a:t>
-            </a:r>
-          </a:p>
-          <a:p>
-            <a:r>
-              <a:rPr lang="en-US" dirty="0"/>
-              <a:t>Benchmark three – user functions</a:t>
-            </a:r>
-          </a:p>
-          <a:p>
-            <a:pPr lvl="1"/>
-            <a:r>
-              <a:rPr lang="en-US" dirty="0"/>
-              <a:t>Allow users to create accounts that will store basic info and custom engines</a:t>
-            </a:r>
-          </a:p>
-          <a:p>
-            <a:r>
-              <a:rPr lang="en-US" dirty="0"/>
-              <a:t>Benchmark four – support for KSP 2</a:t>
-            </a:r>
-          </a:p>
-          <a:p>
-            <a:pPr lvl="1"/>
-            <a:r>
-              <a:rPr lang="en-US" dirty="0"/>
-              <a:t>Bonus benchmark that establishes the base for KSP 2 </a:t>
-            </a:r>
-          </a:p>
-          <a:p>
-            <a:pPr marL="457200" lvl="1" indent="0">
-              <a:buNone/>
-            </a:pPr>
-            <a:r>
-              <a:rPr lang="en-US" dirty="0"/>
-              <a:t>	</a:t>
-            </a:r>
-          </a:p>
-          <a:p>
-            <a:pPr lvl="1"/>
-            <a:endParaRPr lang="en-US" dirty="0"/>
-          </a:p>
-        </p:txBody>
-      </p:sp>
-    </p:spTree>
-    <p:extLst>
-      <p:ext uri="{BB962C8B-B14F-4D97-AF65-F5344CB8AC3E}">
-        <p14:creationId xmlns:p14="http://schemas.microsoft.com/office/powerpoint/2010/main" val="2517046571"/>
-      </p:ext>
-    </p:extLst>
-  </p:cSld>
-  <p:clrMapOvr>
-    <a:masterClrMapping/>
-  </p:clrMapOvr>
-</p:sld>
-</file>
-
 <file path=ppt/slides/slide8.xml><?xml version="1.0" encoding="utf-8"?>
 <p:sld xmlns:a="http://schemas.openxmlformats.org/drawingml/2006/main" xmlns:r="http://schemas.openxmlformats.org/officeDocument/2006/relationships" xmlns:p="http://schemas.openxmlformats.org/presentationml/2006/main">
   <p:cSld>
@@ -6990,7 +7380,7 @@
           <p:cNvPr id="2" name="Title 1">
             <a:extLst>
               <a:ext uri="{FF2B5EF4-FFF2-40B4-BE49-F238E27FC236}">
-                <a16:creationId xmlns:a16="http://schemas.microsoft.com/office/drawing/2014/main" id="{441FC052-823C-479C-BF8E-6113B1DC11A8}"/>
+                <a16:creationId xmlns:a16="http://schemas.microsoft.com/office/drawing/2014/main" id="{FCE038C0-E720-434B-A507-DF4E0E03CB5F}"/>
               </a:ext>
             </a:extLst>
           </p:cNvPr>
@@ -7009,7 +7399,7 @@
             <a:pPr algn="ctr"/>
             <a:r>
               <a:rPr lang="en-US" dirty="0"/>
-              <a:t>tools</a:t>
+              <a:t>Benchmark</a:t>
             </a:r>
           </a:p>
         </p:txBody>
@@ -7019,7 +7409,7 @@
           <p:cNvPr id="3" name="Content Placeholder 2">
             <a:extLst>
               <a:ext uri="{FF2B5EF4-FFF2-40B4-BE49-F238E27FC236}">
-                <a16:creationId xmlns:a16="http://schemas.microsoft.com/office/drawing/2014/main" id="{A16ACF1A-5C5F-400C-84E7-E6C596A03D9D}"/>
+                <a16:creationId xmlns:a16="http://schemas.microsoft.com/office/drawing/2014/main" id="{A0EC9C09-449E-41BD-AAB8-AE931178668F}"/>
               </a:ext>
             </a:extLst>
           </p:cNvPr>
@@ -7032,56 +7422,81 @@
         </p:nvSpPr>
         <p:spPr/>
         <p:txBody>
-          <a:bodyPr/>
-          <a:lstStyle/>
-          <a:p>
-            <a:r>
-              <a:rPr lang="en-US" dirty="0"/>
-              <a:t>Git: main version control</a:t>
-            </a:r>
-          </a:p>
-          <a:p>
-            <a:r>
-              <a:rPr lang="en-US" dirty="0"/>
-              <a:t>GitHub: back up and allow advisor to view my progress</a:t>
-            </a:r>
-          </a:p>
-          <a:p>
-            <a:r>
-              <a:rPr lang="en-US" dirty="0"/>
-              <a:t>Trello: used to help track progress of project</a:t>
-            </a:r>
-          </a:p>
-          <a:p>
-            <a:r>
-              <a:rPr lang="en-US" dirty="0"/>
-              <a:t>NetBeans IDE: main IDE for development</a:t>
-            </a:r>
-          </a:p>
-          <a:p>
-            <a:r>
-              <a:rPr lang="en-US" dirty="0"/>
-              <a:t>Scene Builder: creation of the user interfaces</a:t>
-            </a:r>
-          </a:p>
-          <a:p>
-            <a:r>
-              <a:rPr lang="en-US" dirty="0"/>
-              <a:t>Amazon Web Services: intended database creation using DynamoDB</a:t>
-            </a:r>
-          </a:p>
-          <a:p>
-            <a:r>
-              <a:rPr lang="en-US" dirty="0"/>
-              <a:t>Hardware: mainly PC but support could be made for Mac users if they install Java</a:t>
-            </a:r>
+          <a:bodyPr>
+            <a:normAutofit fontScale="92500" lnSpcReduction="20000"/>
+          </a:bodyPr>
+          <a:lstStyle/>
+          <a:p>
+            <a:r>
+              <a:rPr lang="en-US" dirty="0"/>
+              <a:t>Benchmark one – core functionality</a:t>
+            </a:r>
+          </a:p>
+          <a:p>
+            <a:pPr lvl="1"/>
+            <a:r>
+              <a:rPr lang="en-US" dirty="0"/>
+              <a:t>Handle user input, do calculations, output the values and allow user to select DV/TWR point</a:t>
+            </a:r>
+          </a:p>
+          <a:p>
+            <a:r>
+              <a:rPr lang="en-US" dirty="0"/>
+              <a:t>Benchmark two – database creation</a:t>
+            </a:r>
+          </a:p>
+          <a:p>
+            <a:pPr lvl="1"/>
+            <a:r>
+              <a:rPr lang="en-US" dirty="0"/>
+              <a:t>Create database to store users, custom engines, base planet and engine values</a:t>
+            </a:r>
+          </a:p>
+          <a:p>
+            <a:r>
+              <a:rPr lang="en-US" dirty="0"/>
+              <a:t>Benchmark three – user functions</a:t>
+            </a:r>
+          </a:p>
+          <a:p>
+            <a:pPr lvl="1"/>
+            <a:r>
+              <a:rPr lang="en-US" dirty="0"/>
+              <a:t>Allow users to create accounts that will store basic info and custom engines</a:t>
+            </a:r>
+          </a:p>
+          <a:p>
+            <a:r>
+              <a:rPr lang="en-US" dirty="0"/>
+              <a:t>Benchmark four – support for KSP 2</a:t>
+            </a:r>
+          </a:p>
+          <a:p>
+            <a:pPr lvl="1"/>
+            <a:r>
+              <a:rPr lang="en-US" dirty="0"/>
+              <a:t>Bonus benchmark that establishes the base for KSP 2 </a:t>
+            </a:r>
+          </a:p>
+          <a:p>
+            <a:pPr marL="457200" lvl="1" indent="0">
+              <a:buNone/>
+            </a:pPr>
+            <a:r>
+              <a:rPr lang="en-US" dirty="0"/>
+              <a:t>	</a:t>
+            </a:r>
+          </a:p>
+          <a:p>
+            <a:pPr lvl="1"/>
+            <a:endParaRPr lang="en-US" dirty="0"/>
           </a:p>
         </p:txBody>
       </p:sp>
     </p:spTree>
     <p:extLst>
       <p:ext uri="{BB962C8B-B14F-4D97-AF65-F5344CB8AC3E}">
-        <p14:creationId xmlns:p14="http://schemas.microsoft.com/office/powerpoint/2010/main" val="1062167645"/>
+        <p14:creationId xmlns:p14="http://schemas.microsoft.com/office/powerpoint/2010/main" val="2517046571"/>
       </p:ext>
     </p:extLst>
   </p:cSld>
@@ -7113,7 +7528,7 @@
           <p:cNvPr id="2" name="Title 1">
             <a:extLst>
               <a:ext uri="{FF2B5EF4-FFF2-40B4-BE49-F238E27FC236}">
-                <a16:creationId xmlns:a16="http://schemas.microsoft.com/office/drawing/2014/main" id="{BCF7E804-4F5D-41BC-A9A9-B8D406B74389}"/>
+                <a16:creationId xmlns:a16="http://schemas.microsoft.com/office/drawing/2014/main" id="{441FC052-823C-479C-BF8E-6113B1DC11A8}"/>
               </a:ext>
             </a:extLst>
           </p:cNvPr>
@@ -7132,7 +7547,7 @@
             <a:pPr algn="ctr"/>
             <a:r>
               <a:rPr lang="en-US" dirty="0"/>
-              <a:t>Time schedule</a:t>
+              <a:t>tools</a:t>
             </a:r>
           </a:p>
         </p:txBody>
@@ -7142,7 +7557,7 @@
           <p:cNvPr id="3" name="Content Placeholder 2">
             <a:extLst>
               <a:ext uri="{FF2B5EF4-FFF2-40B4-BE49-F238E27FC236}">
-                <a16:creationId xmlns:a16="http://schemas.microsoft.com/office/drawing/2014/main" id="{327DD466-7C1D-48A5-A0AC-ACC64DEA7221}"/>
+                <a16:creationId xmlns:a16="http://schemas.microsoft.com/office/drawing/2014/main" id="{A16ACF1A-5C5F-400C-84E7-E6C596A03D9D}"/>
               </a:ext>
             </a:extLst>
           </p:cNvPr>
@@ -7160,31 +7575,43 @@
           <a:p>
             <a:r>
               <a:rPr lang="en-US" dirty="0"/>
-              <a:t>Benchmark one:  Weeks 1 – 5 </a:t>
-            </a:r>
-          </a:p>
-          <a:p>
-            <a:r>
-              <a:rPr lang="en-US" dirty="0"/>
-              <a:t>Benchmark two: Weeks 6 – 8</a:t>
-            </a:r>
-          </a:p>
-          <a:p>
-            <a:r>
-              <a:rPr lang="en-US" dirty="0"/>
-              <a:t>Benchmark three: Weeks 9 -12</a:t>
-            </a:r>
-          </a:p>
-          <a:p>
-            <a:r>
-              <a:rPr lang="en-US" dirty="0"/>
-              <a:t>Final testing and report/presentation: Weeks 13 – 14</a:t>
-            </a:r>
-          </a:p>
-          <a:p>
-            <a:r>
-              <a:rPr lang="en-US" dirty="0"/>
-              <a:t>Benchmark four: Pending, will be split up amongst respective benchmarks or as time allows</a:t>
+              <a:t>Git: main version control</a:t>
+            </a:r>
+          </a:p>
+          <a:p>
+            <a:r>
+              <a:rPr lang="en-US" dirty="0"/>
+              <a:t>GitHub: back up and allow advisor to view my progress</a:t>
+            </a:r>
+          </a:p>
+          <a:p>
+            <a:r>
+              <a:rPr lang="en-US" dirty="0"/>
+              <a:t>Trello: used to help track progress of project</a:t>
+            </a:r>
+          </a:p>
+          <a:p>
+            <a:r>
+              <a:rPr lang="en-US" dirty="0"/>
+              <a:t>NetBeans IDE: main IDE for development</a:t>
+            </a:r>
+          </a:p>
+          <a:p>
+            <a:r>
+              <a:rPr lang="en-US" dirty="0"/>
+              <a:t>Scene Builder: creation of the user interfaces</a:t>
+            </a:r>
+          </a:p>
+          <a:p>
+            <a:r>
+              <a:rPr lang="en-US" dirty="0"/>
+              <a:t>Amazon Web Services: intended database creation using DynamoDB</a:t>
+            </a:r>
+          </a:p>
+          <a:p>
+            <a:r>
+              <a:rPr lang="en-US" dirty="0"/>
+              <a:t>Hardware: mainly PC but support could be made for Mac users if they install Java</a:t>
             </a:r>
           </a:p>
         </p:txBody>
@@ -7192,7 +7619,7 @@
     </p:spTree>
     <p:extLst>
       <p:ext uri="{BB962C8B-B14F-4D97-AF65-F5344CB8AC3E}">
-        <p14:creationId xmlns:p14="http://schemas.microsoft.com/office/powerpoint/2010/main" val="1623813321"/>
+        <p14:creationId xmlns:p14="http://schemas.microsoft.com/office/powerpoint/2010/main" val="1062167645"/>
       </p:ext>
     </p:extLst>
   </p:cSld>

</xml_diff>